<commit_message>
Arreglo de las persentaciones
Se ha modificado la presentación de la fase 4 para que sea exclusiva de esta fase.
Se ha añadido una presentación de la fase 5.
</commit_message>
<xml_diff>
--- a/Presentacion_juegos_en_red_fase_4.pptx
+++ b/Presentacion_juegos_en_red_fase_4.pptx
@@ -108,7 +108,18 @@
   </p:defaultTextStyle>
   <p:extLst>
     <p:ext uri="{EFAFB233-063F-42B5-8137-9DF3F51BA10A}">
-      <p15:sldGuideLst xmlns:p15="http://schemas.microsoft.com/office/powerpoint/2012/main" xmlns=""/>
+      <p15:sldGuideLst xmlns:p15="http://schemas.microsoft.com/office/powerpoint/2012/main">
+        <p15:guide id="1" orient="horz" pos="2160">
+          <p15:clr>
+            <a:srgbClr val="A4A3A4"/>
+          </p15:clr>
+        </p15:guide>
+        <p15:guide id="2" pos="3840">
+          <p15:clr>
+            <a:srgbClr val="A4A3A4"/>
+          </p15:clr>
+        </p15:guide>
+      </p15:sldGuideLst>
     </p:ext>
   </p:extLst>
 </p:presentation>
@@ -342,7 +353,7 @@
           <p:cNvPr id="8" name="Date Placeholder 7">
             <a:extLst>
               <a:ext uri="{FF2B5EF4-FFF2-40B4-BE49-F238E27FC236}">
-                <a16:creationId xmlns:a16="http://schemas.microsoft.com/office/drawing/2014/main" xmlns="" id="{7FA0ACE7-29A8-47D3-A7D9-257B711D8023}"/>
+                <a16:creationId xmlns:a16="http://schemas.microsoft.com/office/drawing/2014/main" id="{7FA0ACE7-29A8-47D3-A7D9-257B711D8023}"/>
               </a:ext>
             </a:extLst>
           </p:cNvPr>
@@ -361,7 +372,7 @@
             <a:fld id="{ED291B17-9318-49DB-B28B-6E5994AE9581}" type="datetime1">
               <a:rPr lang="en-US" smtClean="0"/>
               <a:pPr/>
-              <a:t>1/12/2020</a:t>
+              <a:t>1/15/2020</a:t>
             </a:fld>
             <a:endParaRPr lang="en-US"/>
           </a:p>
@@ -372,7 +383,7 @@
           <p:cNvPr id="9" name="Footer Placeholder 8">
             <a:extLst>
               <a:ext uri="{FF2B5EF4-FFF2-40B4-BE49-F238E27FC236}">
-                <a16:creationId xmlns:a16="http://schemas.microsoft.com/office/drawing/2014/main" xmlns="" id="{DEC604B9-52E9-4810-8359-47206518D038}"/>
+                <a16:creationId xmlns:a16="http://schemas.microsoft.com/office/drawing/2014/main" id="{DEC604B9-52E9-4810-8359-47206518D038}"/>
               </a:ext>
             </a:extLst>
           </p:cNvPr>
@@ -397,7 +408,7 @@
           <p:cNvPr id="10" name="Slide Number Placeholder 9">
             <a:extLst>
               <a:ext uri="{FF2B5EF4-FFF2-40B4-BE49-F238E27FC236}">
-                <a16:creationId xmlns:a16="http://schemas.microsoft.com/office/drawing/2014/main" xmlns="" id="{5898A89F-CA25-400F-B05A-AECBF2517E4F}"/>
+                <a16:creationId xmlns:a16="http://schemas.microsoft.com/office/drawing/2014/main" id="{5898A89F-CA25-400F-B05A-AECBF2517E4F}"/>
               </a:ext>
             </a:extLst>
           </p:cNvPr>
@@ -425,7 +436,7 @@
     </p:spTree>
     <p:extLst>
       <p:ext uri="{BB962C8B-B14F-4D97-AF65-F5344CB8AC3E}">
-        <p14:creationId xmlns:p14="http://schemas.microsoft.com/office/powerpoint/2010/main" xmlns="" val="3942214325"/>
+        <p14:creationId xmlns:p14="http://schemas.microsoft.com/office/powerpoint/2010/main" val="3942214325"/>
       </p:ext>
     </p:extLst>
   </p:cSld>
@@ -564,7 +575,7 @@
             <a:fld id="{2CED4963-E985-44C4-B8C4-FDD613B7C2F8}" type="datetime1">
               <a:rPr lang="en-US" smtClean="0"/>
               <a:pPr/>
-              <a:t>1/12/2020</a:t>
+              <a:t>1/15/2020</a:t>
             </a:fld>
             <a:endParaRPr lang="en-US"/>
           </a:p>
@@ -616,7 +627,7 @@
     </p:spTree>
     <p:extLst>
       <p:ext uri="{BB962C8B-B14F-4D97-AF65-F5344CB8AC3E}">
-        <p14:creationId xmlns:p14="http://schemas.microsoft.com/office/powerpoint/2010/main" xmlns="" val="3618472523"/>
+        <p14:creationId xmlns:p14="http://schemas.microsoft.com/office/powerpoint/2010/main" val="3618472523"/>
       </p:ext>
     </p:extLst>
   </p:cSld>
@@ -778,7 +789,7 @@
           <p:cNvPr id="8" name="Rectangle 7">
             <a:extLst>
               <a:ext uri="{FF2B5EF4-FFF2-40B4-BE49-F238E27FC236}">
-                <a16:creationId xmlns:a16="http://schemas.microsoft.com/office/drawing/2014/main" xmlns="" id="{F6423B97-A5D4-47B9-8861-73B3707A04CF}"/>
+                <a16:creationId xmlns:a16="http://schemas.microsoft.com/office/drawing/2014/main" id="{F6423B97-A5D4-47B9-8861-73B3707A04CF}"/>
               </a:ext>
             </a:extLst>
           </p:cNvPr>
@@ -821,7 +832,7 @@
           <p:cNvPr id="9" name="Rectangle 8">
             <a:extLst>
               <a:ext uri="{FF2B5EF4-FFF2-40B4-BE49-F238E27FC236}">
-                <a16:creationId xmlns:a16="http://schemas.microsoft.com/office/drawing/2014/main" xmlns="" id="{1AEC0421-37B4-4481-A10D-69FDF5EC7909}"/>
+                <a16:creationId xmlns:a16="http://schemas.microsoft.com/office/drawing/2014/main" id="{1AEC0421-37B4-4481-A10D-69FDF5EC7909}"/>
               </a:ext>
             </a:extLst>
           </p:cNvPr>
@@ -864,7 +875,7 @@
           <p:cNvPr id="10" name="Rectangle 9">
             <a:extLst>
               <a:ext uri="{FF2B5EF4-FFF2-40B4-BE49-F238E27FC236}">
-                <a16:creationId xmlns:a16="http://schemas.microsoft.com/office/drawing/2014/main" xmlns="" id="{5F7265B5-9F97-4F1E-99E9-74F7B7E62337}"/>
+                <a16:creationId xmlns:a16="http://schemas.microsoft.com/office/drawing/2014/main" id="{5F7265B5-9F97-4F1E-99E9-74F7B7E62337}"/>
               </a:ext>
             </a:extLst>
           </p:cNvPr>
@@ -907,7 +918,7 @@
           <p:cNvPr id="11" name="Date Placeholder 10">
             <a:extLst>
               <a:ext uri="{FF2B5EF4-FFF2-40B4-BE49-F238E27FC236}">
-                <a16:creationId xmlns:a16="http://schemas.microsoft.com/office/drawing/2014/main" xmlns="" id="{5C74A470-3BD3-4F33-80E5-67E6E87FCBE7}"/>
+                <a16:creationId xmlns:a16="http://schemas.microsoft.com/office/drawing/2014/main" id="{5C74A470-3BD3-4F33-80E5-67E6E87FCBE7}"/>
               </a:ext>
             </a:extLst>
           </p:cNvPr>
@@ -926,7 +937,7 @@
             <a:fld id="{ED291B17-9318-49DB-B28B-6E5994AE9581}" type="datetime1">
               <a:rPr lang="en-US" smtClean="0"/>
               <a:pPr/>
-              <a:t>1/12/2020</a:t>
+              <a:t>1/15/2020</a:t>
             </a:fld>
             <a:endParaRPr lang="en-US"/>
           </a:p>
@@ -937,7 +948,7 @@
           <p:cNvPr id="12" name="Footer Placeholder 11">
             <a:extLst>
               <a:ext uri="{FF2B5EF4-FFF2-40B4-BE49-F238E27FC236}">
-                <a16:creationId xmlns:a16="http://schemas.microsoft.com/office/drawing/2014/main" xmlns="" id="{9A3A30BA-DB50-4D7D-BCDE-17D20FB354DF}"/>
+                <a16:creationId xmlns:a16="http://schemas.microsoft.com/office/drawing/2014/main" id="{9A3A30BA-DB50-4D7D-BCDE-17D20FB354DF}"/>
               </a:ext>
             </a:extLst>
           </p:cNvPr>
@@ -962,7 +973,7 @@
           <p:cNvPr id="13" name="Slide Number Placeholder 12">
             <a:extLst>
               <a:ext uri="{FF2B5EF4-FFF2-40B4-BE49-F238E27FC236}">
-                <a16:creationId xmlns:a16="http://schemas.microsoft.com/office/drawing/2014/main" xmlns="" id="{76FF9E58-C0B2-436B-A21C-DB45A00D6515}"/>
+                <a16:creationId xmlns:a16="http://schemas.microsoft.com/office/drawing/2014/main" id="{76FF9E58-C0B2-436B-A21C-DB45A00D6515}"/>
               </a:ext>
             </a:extLst>
           </p:cNvPr>
@@ -990,7 +1001,7 @@
     </p:spTree>
     <p:extLst>
       <p:ext uri="{BB962C8B-B14F-4D97-AF65-F5344CB8AC3E}">
-        <p14:creationId xmlns:p14="http://schemas.microsoft.com/office/powerpoint/2010/main" xmlns="" val="1024354171"/>
+        <p14:creationId xmlns:p14="http://schemas.microsoft.com/office/powerpoint/2010/main" val="1024354171"/>
       </p:ext>
     </p:extLst>
   </p:cSld>
@@ -1105,7 +1116,7 @@
           <p:cNvPr id="8" name="Date Placeholder 7">
             <a:extLst>
               <a:ext uri="{FF2B5EF4-FFF2-40B4-BE49-F238E27FC236}">
-                <a16:creationId xmlns:a16="http://schemas.microsoft.com/office/drawing/2014/main" xmlns="" id="{770E6237-3456-439F-802D-3BA93FC7E3E5}"/>
+                <a16:creationId xmlns:a16="http://schemas.microsoft.com/office/drawing/2014/main" id="{770E6237-3456-439F-802D-3BA93FC7E3E5}"/>
               </a:ext>
             </a:extLst>
           </p:cNvPr>
@@ -1124,7 +1135,7 @@
             <a:fld id="{78DD82B9-B8EE-4375-B6FF-88FA6ABB15D9}" type="datetime1">
               <a:rPr lang="en-US" smtClean="0"/>
               <a:pPr/>
-              <a:t>1/12/2020</a:t>
+              <a:t>1/15/2020</a:t>
             </a:fld>
             <a:endParaRPr lang="en-US"/>
           </a:p>
@@ -1135,7 +1146,7 @@
           <p:cNvPr id="9" name="Footer Placeholder 8">
             <a:extLst>
               <a:ext uri="{FF2B5EF4-FFF2-40B4-BE49-F238E27FC236}">
-                <a16:creationId xmlns:a16="http://schemas.microsoft.com/office/drawing/2014/main" xmlns="" id="{1356D3B5-6063-4A89-B88F-9D3043916FF8}"/>
+                <a16:creationId xmlns:a16="http://schemas.microsoft.com/office/drawing/2014/main" id="{1356D3B5-6063-4A89-B88F-9D3043916FF8}"/>
               </a:ext>
             </a:extLst>
           </p:cNvPr>
@@ -1160,7 +1171,7 @@
           <p:cNvPr id="10" name="Slide Number Placeholder 9">
             <a:extLst>
               <a:ext uri="{FF2B5EF4-FFF2-40B4-BE49-F238E27FC236}">
-                <a16:creationId xmlns:a16="http://schemas.microsoft.com/office/drawing/2014/main" xmlns="" id="{02B78BF7-69D3-4CE0-A631-50EFD41EEEB8}"/>
+                <a16:creationId xmlns:a16="http://schemas.microsoft.com/office/drawing/2014/main" id="{02B78BF7-69D3-4CE0-A631-50EFD41EEEB8}"/>
               </a:ext>
             </a:extLst>
           </p:cNvPr>
@@ -1188,7 +1199,7 @@
     </p:spTree>
     <p:extLst>
       <p:ext uri="{BB962C8B-B14F-4D97-AF65-F5344CB8AC3E}">
-        <p14:creationId xmlns:p14="http://schemas.microsoft.com/office/powerpoint/2010/main" xmlns="" val="2849553253"/>
+        <p14:creationId xmlns:p14="http://schemas.microsoft.com/office/powerpoint/2010/main" val="2849553253"/>
       </p:ext>
     </p:extLst>
   </p:cSld>
@@ -1418,7 +1429,7 @@
           <p:cNvPr id="7" name="Date Placeholder 6">
             <a:extLst>
               <a:ext uri="{FF2B5EF4-FFF2-40B4-BE49-F238E27FC236}">
-                <a16:creationId xmlns:a16="http://schemas.microsoft.com/office/drawing/2014/main" xmlns="" id="{61582016-5696-4A93-887F-BBB3B9002FE5}"/>
+                <a16:creationId xmlns:a16="http://schemas.microsoft.com/office/drawing/2014/main" id="{61582016-5696-4A93-887F-BBB3B9002FE5}"/>
               </a:ext>
             </a:extLst>
           </p:cNvPr>
@@ -1437,7 +1448,7 @@
             <a:fld id="{B2497495-0637-405E-AE64-5CC7506D51F5}" type="datetime1">
               <a:rPr lang="en-US" smtClean="0"/>
               <a:pPr/>
-              <a:t>1/12/2020</a:t>
+              <a:t>1/15/2020</a:t>
             </a:fld>
             <a:endParaRPr lang="en-US"/>
           </a:p>
@@ -1448,7 +1459,7 @@
           <p:cNvPr id="9" name="Footer Placeholder 8">
             <a:extLst>
               <a:ext uri="{FF2B5EF4-FFF2-40B4-BE49-F238E27FC236}">
-                <a16:creationId xmlns:a16="http://schemas.microsoft.com/office/drawing/2014/main" xmlns="" id="{857CFCD5-1192-4E18-8A8F-29E153B44DA4}"/>
+                <a16:creationId xmlns:a16="http://schemas.microsoft.com/office/drawing/2014/main" id="{857CFCD5-1192-4E18-8A8F-29E153B44DA4}"/>
               </a:ext>
             </a:extLst>
           </p:cNvPr>
@@ -1473,7 +1484,7 @@
           <p:cNvPr id="10" name="Slide Number Placeholder 9">
             <a:extLst>
               <a:ext uri="{FF2B5EF4-FFF2-40B4-BE49-F238E27FC236}">
-                <a16:creationId xmlns:a16="http://schemas.microsoft.com/office/drawing/2014/main" xmlns="" id="{E39A109E-5018-4794-92B3-FD5E5BCD95E8}"/>
+                <a16:creationId xmlns:a16="http://schemas.microsoft.com/office/drawing/2014/main" id="{E39A109E-5018-4794-92B3-FD5E5BCD95E8}"/>
               </a:ext>
             </a:extLst>
           </p:cNvPr>
@@ -1501,7 +1512,7 @@
     </p:spTree>
     <p:extLst>
       <p:ext uri="{BB962C8B-B14F-4D97-AF65-F5344CB8AC3E}">
-        <p14:creationId xmlns:p14="http://schemas.microsoft.com/office/powerpoint/2010/main" xmlns="" val="3196222440"/>
+        <p14:creationId xmlns:p14="http://schemas.microsoft.com/office/powerpoint/2010/main" val="3196222440"/>
       </p:ext>
     </p:extLst>
   </p:cSld>
@@ -1689,7 +1700,7 @@
             <a:fld id="{7BFFD690-9426-415D-8B65-26881E07B2D4}" type="datetime1">
               <a:rPr lang="en-US" smtClean="0"/>
               <a:pPr/>
-              <a:t>1/12/2020</a:t>
+              <a:t>1/15/2020</a:t>
             </a:fld>
             <a:endParaRPr lang="en-US"/>
           </a:p>
@@ -1741,7 +1752,7 @@
     </p:spTree>
     <p:extLst>
       <p:ext uri="{BB962C8B-B14F-4D97-AF65-F5344CB8AC3E}">
-        <p14:creationId xmlns:p14="http://schemas.microsoft.com/office/powerpoint/2010/main" xmlns="" val="2591806527"/>
+        <p14:creationId xmlns:p14="http://schemas.microsoft.com/office/powerpoint/2010/main" val="2591806527"/>
       </p:ext>
     </p:extLst>
   </p:cSld>
@@ -2110,7 +2121,7 @@
             <a:fld id="{04C4989A-474C-40DE-95B9-011C28B71673}" type="datetime1">
               <a:rPr lang="en-US" smtClean="0"/>
               <a:pPr/>
-              <a:t>1/12/2020</a:t>
+              <a:t>1/15/2020</a:t>
             </a:fld>
             <a:endParaRPr lang="en-US"/>
           </a:p>
@@ -2162,7 +2173,7 @@
     </p:spTree>
     <p:extLst>
       <p:ext uri="{BB962C8B-B14F-4D97-AF65-F5344CB8AC3E}">
-        <p14:creationId xmlns:p14="http://schemas.microsoft.com/office/powerpoint/2010/main" xmlns="" val="2231116499"/>
+        <p14:creationId xmlns:p14="http://schemas.microsoft.com/office/powerpoint/2010/main" val="2231116499"/>
       </p:ext>
     </p:extLst>
   </p:cSld>
@@ -2234,7 +2245,7 @@
             <a:fld id="{5DB4ED54-5B5E-4A04-93D3-5772E3CE3818}" type="datetime1">
               <a:rPr lang="en-US" smtClean="0"/>
               <a:pPr/>
-              <a:t>1/12/2020</a:t>
+              <a:t>1/15/2020</a:t>
             </a:fld>
             <a:endParaRPr lang="en-US"/>
           </a:p>
@@ -2286,7 +2297,7 @@
     </p:spTree>
     <p:extLst>
       <p:ext uri="{BB962C8B-B14F-4D97-AF65-F5344CB8AC3E}">
-        <p14:creationId xmlns:p14="http://schemas.microsoft.com/office/powerpoint/2010/main" xmlns="" val="872990198"/>
+        <p14:creationId xmlns:p14="http://schemas.microsoft.com/office/powerpoint/2010/main" val="872990198"/>
       </p:ext>
     </p:extLst>
   </p:cSld>
@@ -2331,7 +2342,7 @@
             <a:fld id="{4EDE50D6-574B-40AF-946F-D52A04ADE379}" type="datetime1">
               <a:rPr lang="en-US" smtClean="0"/>
               <a:pPr/>
-              <a:t>1/12/2020</a:t>
+              <a:t>1/15/2020</a:t>
             </a:fld>
             <a:endParaRPr lang="en-US"/>
           </a:p>
@@ -2383,7 +2394,7 @@
     </p:spTree>
     <p:extLst>
       <p:ext uri="{BB962C8B-B14F-4D97-AF65-F5344CB8AC3E}">
-        <p14:creationId xmlns:p14="http://schemas.microsoft.com/office/powerpoint/2010/main" xmlns="" val="3680560749"/>
+        <p14:creationId xmlns:p14="http://schemas.microsoft.com/office/powerpoint/2010/main" val="3680560749"/>
       </p:ext>
     </p:extLst>
   </p:cSld>
@@ -2684,7 +2695,7 @@
           <p:cNvPr id="8" name="Date Placeholder 7">
             <a:extLst>
               <a:ext uri="{FF2B5EF4-FFF2-40B4-BE49-F238E27FC236}">
-                <a16:creationId xmlns:a16="http://schemas.microsoft.com/office/drawing/2014/main" xmlns="" id="{0B919CC2-2A65-446F-B538-9E6249035445}"/>
+                <a16:creationId xmlns:a16="http://schemas.microsoft.com/office/drawing/2014/main" id="{0B919CC2-2A65-446F-B538-9E6249035445}"/>
               </a:ext>
             </a:extLst>
           </p:cNvPr>
@@ -2708,7 +2719,7 @@
             <a:fld id="{D82884F1-FFEA-405F-9602-3DCA865EDA4E}" type="datetime1">
               <a:rPr lang="en-US" smtClean="0"/>
               <a:pPr/>
-              <a:t>1/12/2020</a:t>
+              <a:t>1/15/2020</a:t>
             </a:fld>
             <a:endParaRPr lang="en-US"/>
           </a:p>
@@ -2719,7 +2730,7 @@
           <p:cNvPr id="10" name="Footer Placeholder 9">
             <a:extLst>
               <a:ext uri="{FF2B5EF4-FFF2-40B4-BE49-F238E27FC236}">
-                <a16:creationId xmlns:a16="http://schemas.microsoft.com/office/drawing/2014/main" xmlns="" id="{B72412AE-119E-4982-8B24-63365EFCA796}"/>
+                <a16:creationId xmlns:a16="http://schemas.microsoft.com/office/drawing/2014/main" id="{B72412AE-119E-4982-8B24-63365EFCA796}"/>
               </a:ext>
             </a:extLst>
           </p:cNvPr>
@@ -2749,7 +2760,7 @@
           <p:cNvPr id="11" name="Slide Number Placeholder 10">
             <a:extLst>
               <a:ext uri="{FF2B5EF4-FFF2-40B4-BE49-F238E27FC236}">
-                <a16:creationId xmlns:a16="http://schemas.microsoft.com/office/drawing/2014/main" xmlns="" id="{7FC4BB19-6AD1-45CF-9F99-00B109890FAB}"/>
+                <a16:creationId xmlns:a16="http://schemas.microsoft.com/office/drawing/2014/main" id="{7FC4BB19-6AD1-45CF-9F99-00B109890FAB}"/>
               </a:ext>
             </a:extLst>
           </p:cNvPr>
@@ -2782,7 +2793,7 @@
     </p:spTree>
     <p:extLst>
       <p:ext uri="{BB962C8B-B14F-4D97-AF65-F5344CB8AC3E}">
-        <p14:creationId xmlns:p14="http://schemas.microsoft.com/office/powerpoint/2010/main" xmlns="" val="1682280103"/>
+        <p14:creationId xmlns:p14="http://schemas.microsoft.com/office/powerpoint/2010/main" val="1682280103"/>
       </p:ext>
     </p:extLst>
   </p:cSld>
@@ -3000,7 +3011,7 @@
             <a:fld id="{7E18DB4A-8810-4A10-AD5C-D5E2C667F5B3}" type="datetime1">
               <a:rPr lang="en-US" smtClean="0"/>
               <a:pPr/>
-              <a:t>1/12/2020</a:t>
+              <a:t>1/15/2020</a:t>
             </a:fld>
             <a:endParaRPr lang="en-US"/>
           </a:p>
@@ -3053,7 +3064,7 @@
     </p:spTree>
     <p:extLst>
       <p:ext uri="{BB962C8B-B14F-4D97-AF65-F5344CB8AC3E}">
-        <p14:creationId xmlns:p14="http://schemas.microsoft.com/office/powerpoint/2010/main" xmlns="" val="1404282162"/>
+        <p14:creationId xmlns:p14="http://schemas.microsoft.com/office/powerpoint/2010/main" val="1404282162"/>
       </p:ext>
     </p:extLst>
   </p:cSld>
@@ -3215,7 +3226,7 @@
             <a:fld id="{ED291B17-9318-49DB-B28B-6E5994AE9581}" type="datetime1">
               <a:rPr lang="en-US" smtClean="0"/>
               <a:pPr/>
-              <a:t>1/12/2020</a:t>
+              <a:t>1/15/2020</a:t>
             </a:fld>
             <a:endParaRPr lang="en-US"/>
           </a:p>
@@ -3416,7 +3427,7 @@
     </p:spTree>
     <p:extLst>
       <p:ext uri="{BB962C8B-B14F-4D97-AF65-F5344CB8AC3E}">
-        <p14:creationId xmlns:p14="http://schemas.microsoft.com/office/powerpoint/2010/main" xmlns="" val="4084512255"/>
+        <p14:creationId xmlns:p14="http://schemas.microsoft.com/office/powerpoint/2010/main" val="4084512255"/>
       </p:ext>
     </p:extLst>
   </p:cSld>
@@ -3861,10 +3872,10 @@
           <p:cNvPr id="64" name="Rectangle 60">
             <a:extLst>
               <a:ext uri="{FF2B5EF4-FFF2-40B4-BE49-F238E27FC236}">
-                <a16:creationId xmlns:a16="http://schemas.microsoft.com/office/drawing/2014/main" xmlns="" id="{E6C8E6EB-4C59-429B-97E4-72A058CFC4FB}"/>
+                <a16:creationId xmlns:a16="http://schemas.microsoft.com/office/drawing/2014/main" id="{E6C8E6EB-4C59-429B-97E4-72A058CFC4FB}"/>
               </a:ext>
               <a:ext uri="{C183D7F6-B498-43B3-948B-1728B52AA6E4}">
-                <adec:decorative xmlns="" xmlns:adec="http://schemas.microsoft.com/office/drawing/2017/decorative" val="1"/>
+                <adec:decorative xmlns:adec="http://schemas.microsoft.com/office/drawing/2017/decorative" val="1"/>
               </a:ext>
             </a:extLst>
           </p:cNvPr>
@@ -3874,7 +3885,7 @@
           <p:nvPr>
             <p:extLst>
               <p:ext uri="{386F3935-93C4-4BCD-93E2-E3B085C9AB24}">
-                <p16:designElem xmlns:p16="http://schemas.microsoft.com/office/powerpoint/2015/main" xmlns="" val="1"/>
+                <p16:designElem xmlns:p16="http://schemas.microsoft.com/office/powerpoint/2015/main" val="1"/>
               </p:ext>
             </p:extLst>
           </p:nvPr>
@@ -3915,10 +3926,10 @@
           <p:cNvPr id="66" name="Rectangle 62">
             <a:extLst>
               <a:ext uri="{FF2B5EF4-FFF2-40B4-BE49-F238E27FC236}">
-                <a16:creationId xmlns:a16="http://schemas.microsoft.com/office/drawing/2014/main" xmlns="" id="{B5B90362-AFCC-46A9-B41C-A257A8C5B314}"/>
+                <a16:creationId xmlns:a16="http://schemas.microsoft.com/office/drawing/2014/main" id="{B5B90362-AFCC-46A9-B41C-A257A8C5B314}"/>
               </a:ext>
               <a:ext uri="{C183D7F6-B498-43B3-948B-1728B52AA6E4}">
-                <adec:decorative xmlns="" xmlns:adec="http://schemas.microsoft.com/office/drawing/2017/decorative" val="1"/>
+                <adec:decorative xmlns:adec="http://schemas.microsoft.com/office/drawing/2017/decorative" val="1"/>
               </a:ext>
             </a:extLst>
           </p:cNvPr>
@@ -3928,7 +3939,7 @@
           <p:nvPr>
             <p:extLst>
               <p:ext uri="{386F3935-93C4-4BCD-93E2-E3B085C9AB24}">
-                <p16:designElem xmlns:p16="http://schemas.microsoft.com/office/powerpoint/2015/main" xmlns="" val="1"/>
+                <p16:designElem xmlns:p16="http://schemas.microsoft.com/office/powerpoint/2015/main" val="1"/>
               </p:ext>
             </p:extLst>
           </p:nvPr>
@@ -3969,10 +3980,10 @@
           <p:cNvPr id="68" name="Rectangle 64">
             <a:extLst>
               <a:ext uri="{FF2B5EF4-FFF2-40B4-BE49-F238E27FC236}">
-                <a16:creationId xmlns:a16="http://schemas.microsoft.com/office/drawing/2014/main" xmlns="" id="{F71EF7F1-38BA-471D-8CD4-2A9AE8E35527}"/>
+                <a16:creationId xmlns:a16="http://schemas.microsoft.com/office/drawing/2014/main" id="{F71EF7F1-38BA-471D-8CD4-2A9AE8E35527}"/>
               </a:ext>
               <a:ext uri="{C183D7F6-B498-43B3-948B-1728B52AA6E4}">
-                <adec:decorative xmlns="" xmlns:adec="http://schemas.microsoft.com/office/drawing/2017/decorative" val="1"/>
+                <adec:decorative xmlns:adec="http://schemas.microsoft.com/office/drawing/2017/decorative" val="1"/>
               </a:ext>
             </a:extLst>
           </p:cNvPr>
@@ -3982,7 +3993,7 @@
           <p:nvPr>
             <p:extLst>
               <p:ext uri="{386F3935-93C4-4BCD-93E2-E3B085C9AB24}">
-                <p16:designElem xmlns:p16="http://schemas.microsoft.com/office/powerpoint/2015/main" xmlns="" val="1"/>
+                <p16:designElem xmlns:p16="http://schemas.microsoft.com/office/powerpoint/2015/main" val="1"/>
               </p:ext>
             </p:extLst>
           </p:nvPr>
@@ -4023,10 +4034,10 @@
           <p:cNvPr id="70" name="Rectangle 66">
             <a:extLst>
               <a:ext uri="{FF2B5EF4-FFF2-40B4-BE49-F238E27FC236}">
-                <a16:creationId xmlns:a16="http://schemas.microsoft.com/office/drawing/2014/main" xmlns="" id="{B8DD2392-397B-48BF-BEFA-EA1FB881CA85}"/>
+                <a16:creationId xmlns:a16="http://schemas.microsoft.com/office/drawing/2014/main" id="{B8DD2392-397B-48BF-BEFA-EA1FB881CA85}"/>
               </a:ext>
               <a:ext uri="{C183D7F6-B498-43B3-948B-1728B52AA6E4}">
-                <adec:decorative xmlns="" xmlns:adec="http://schemas.microsoft.com/office/drawing/2017/decorative" val="1"/>
+                <adec:decorative xmlns:adec="http://schemas.microsoft.com/office/drawing/2017/decorative" val="1"/>
               </a:ext>
             </a:extLst>
           </p:cNvPr>
@@ -4036,7 +4047,7 @@
           <p:nvPr>
             <p:extLst>
               <p:ext uri="{386F3935-93C4-4BCD-93E2-E3B085C9AB24}">
-                <p16:designElem xmlns:p16="http://schemas.microsoft.com/office/powerpoint/2015/main" xmlns="" val="1"/>
+                <p16:designElem xmlns:p16="http://schemas.microsoft.com/office/powerpoint/2015/main" val="1"/>
               </p:ext>
             </p:extLst>
           </p:nvPr>
@@ -4083,7 +4094,7 @@
           <p:cNvPr id="5" name="Imagen 7" descr="Imagen que contiene mapa, texto, papalote, tabla&#10;&#10;Descripción generada con confianza muy alta">
             <a:extLst>
               <a:ext uri="{FF2B5EF4-FFF2-40B4-BE49-F238E27FC236}">
-                <a16:creationId xmlns:a16="http://schemas.microsoft.com/office/drawing/2014/main" xmlns="" id="{3FC055FA-F0FB-4A9F-9301-4B3751FDAD6E}"/>
+                <a16:creationId xmlns:a16="http://schemas.microsoft.com/office/drawing/2014/main" id="{3FC055FA-F0FB-4A9F-9301-4B3751FDAD6E}"/>
               </a:ext>
             </a:extLst>
           </p:cNvPr>
@@ -4175,7 +4186,7 @@
           <p:cNvPr id="6" name="Subtítulo 5">
             <a:extLst>
               <a:ext uri="{FF2B5EF4-FFF2-40B4-BE49-F238E27FC236}">
-                <a16:creationId xmlns:a16="http://schemas.microsoft.com/office/drawing/2014/main" xmlns="" id="{F17E910C-F264-4FE9-9B55-8ADB7CA5C568}"/>
+                <a16:creationId xmlns:a16="http://schemas.microsoft.com/office/drawing/2014/main" id="{F17E910C-F264-4FE9-9B55-8ADB7CA5C568}"/>
               </a:ext>
             </a:extLst>
           </p:cNvPr>
@@ -4373,46 +4384,26 @@
           <a:p>
             <a:pPr algn="ctr"/>
             <a:r>
-              <a:rPr lang="es-ES" sz="2400" b="1" dirty="0" smtClean="0">
+              <a:rPr lang="es-ES" sz="2400" b="1" dirty="0">
                 <a:latin typeface="Segoe UI Black" panose="020B0A02040204020203" pitchFamily="34" charset="0"/>
                 <a:ea typeface="Segoe UI Black" panose="020B0A02040204020203" pitchFamily="34" charset="0"/>
                 <a:cs typeface="Times New Roman" panose="02020603050405020304" pitchFamily="18" charset="0"/>
               </a:rPr>
-              <a:t>FASE </a:t>
-            </a:r>
-            <a:r>
-              <a:rPr lang="es-ES" sz="2400" b="1" dirty="0" smtClean="0">
-                <a:latin typeface="Segoe UI Black" panose="020B0A02040204020203" pitchFamily="34" charset="0"/>
-                <a:ea typeface="Segoe UI Black" panose="020B0A02040204020203" pitchFamily="34" charset="0"/>
-                <a:cs typeface="Times New Roman" panose="02020603050405020304" pitchFamily="18" charset="0"/>
-              </a:rPr>
-              <a:t>4</a:t>
-            </a:r>
-            <a:endParaRPr lang="es-ES" sz="2400" b="1" dirty="0">
-              <a:latin typeface="Segoe UI Black" panose="020B0A02040204020203" pitchFamily="34" charset="0"/>
-              <a:ea typeface="Segoe UI Black" panose="020B0A02040204020203" pitchFamily="34" charset="0"/>
-              <a:cs typeface="Times New Roman" panose="02020603050405020304" pitchFamily="18" charset="0"/>
-            </a:endParaRPr>
+              <a:t>FASE 4</a:t>
+            </a:r>
           </a:p>
         </p:txBody>
       </p:sp>
     </p:spTree>
     <p:extLst>
       <p:ext uri="{BB962C8B-B14F-4D97-AF65-F5344CB8AC3E}">
-        <p14:creationId xmlns:p14="http://schemas.microsoft.com/office/powerpoint/2010/main" xmlns="" val="2406273178"/>
+        <p14:creationId xmlns:p14="http://schemas.microsoft.com/office/powerpoint/2010/main" val="2406273178"/>
       </p:ext>
     </p:extLst>
   </p:cSld>
   <p:clrMapOvr>
     <a:overrideClrMapping bg1="dk1" tx1="lt1" bg2="dk2" tx2="lt2" accent1="accent1" accent2="accent2" accent3="accent3" accent4="accent4" accent5="accent5" accent6="accent6" hlink="hlink" folHlink="folHlink"/>
   </p:clrMapOvr>
-  <p:timing>
-    <p:tnLst>
-      <p:par>
-        <p:cTn id="1" dur="indefinite" restart="never" nodeType="tmRoot"/>
-      </p:par>
-    </p:tnLst>
-  </p:timing>
 </p:sld>
 </file>
 
@@ -4456,23 +4447,12 @@
           <a:lstStyle/>
           <a:p>
             <a:r>
-              <a:rPr lang="es-ES" sz="4000" dirty="0" smtClean="0">
+              <a:rPr lang="es-ES" sz="4000" dirty="0">
                 <a:latin typeface="Segoe UI Black" panose="020B0A02040204020203" pitchFamily="34" charset="0"/>
                 <a:ea typeface="Segoe UI Black" panose="020B0A02040204020203" pitchFamily="34" charset="0"/>
               </a:rPr>
-              <a:t>AÑADIDOS FASE </a:t>
-            </a:r>
-            <a:r>
-              <a:rPr lang="es-ES" sz="4000" dirty="0" smtClean="0">
-                <a:latin typeface="Segoe UI Black" panose="020B0A02040204020203" pitchFamily="34" charset="0"/>
-                <a:ea typeface="Segoe UI Black" panose="020B0A02040204020203" pitchFamily="34" charset="0"/>
-              </a:rPr>
-              <a:t>4</a:t>
-            </a:r>
-            <a:endParaRPr lang="es-ES" sz="4000" dirty="0">
-              <a:latin typeface="Segoe UI Black" panose="020B0A02040204020203" pitchFamily="34" charset="0"/>
-              <a:ea typeface="Segoe UI Black" panose="020B0A02040204020203" pitchFamily="34" charset="0"/>
-            </a:endParaRPr>
+              <a:t>AÑADIDOS FASE 4</a:t>
+            </a:r>
           </a:p>
         </p:txBody>
       </p:sp>
@@ -4497,54 +4477,34 @@
           <a:lstStyle/>
           <a:p>
             <a:r>
-              <a:rPr lang="es-ES" sz="2800" dirty="0" smtClean="0"/>
-              <a:t>JUEGO ONLINE</a:t>
-            </a:r>
-            <a:endParaRPr lang="es-ES" sz="2800" dirty="0" smtClean="0"/>
-          </a:p>
-          <a:p>
-            <a:r>
-              <a:rPr lang="es-ES" sz="2800" dirty="0" smtClean="0"/>
-              <a:t>MENÚ DE OPCIONES DE SONIDO</a:t>
-            </a:r>
-            <a:endParaRPr lang="es-ES" sz="2800" dirty="0" smtClean="0"/>
-          </a:p>
-          <a:p>
-            <a:r>
-              <a:rPr lang="es-ES" sz="2800" dirty="0" smtClean="0"/>
-              <a:t>SELECCIÓN DE NÚMERO DE VIDAS POR JUGADOR</a:t>
-            </a:r>
-            <a:endParaRPr lang="es-ES" sz="2800" dirty="0" smtClean="0"/>
-          </a:p>
-          <a:p>
-            <a:r>
-              <a:rPr lang="es-ES" sz="2800" smtClean="0"/>
-              <a:t>SELECCIÓN DE VELOCIDAD DE CAÍDA DE LOS TRONCOS</a:t>
-            </a:r>
-            <a:endParaRPr lang="es-ES" sz="2800" dirty="0" smtClean="0"/>
-          </a:p>
-          <a:p>
-            <a:endParaRPr lang="es-ES" dirty="0"/>
+              <a:rPr lang="es-ES" sz="2800" dirty="0"/>
+              <a:t>ENTRADA AL LOBBY SIN INTRODUCIR IP, Y USO DEL MISMO PARA INICIAR UNA PARTIDA.</a:t>
+            </a:r>
+          </a:p>
+          <a:p>
+            <a:r>
+              <a:rPr lang="es-ES" sz="2800" dirty="0"/>
+              <a:t>USO DE WEBSOCKETS PARA JUGAR UNA PARTIDA ENTRE 2 JUGADORES DESDE DISTINTOS ORDENADORES.</a:t>
+            </a:r>
+          </a:p>
+          <a:p>
+            <a:r>
+              <a:rPr lang="es-ES" sz="2800" dirty="0"/>
+              <a:t>USO DE WEBSOCKETS PARA EL INTERCAMBIO DEL ESTADO DE LA PARTIDA ENTRE LOS JUGADORES.</a:t>
+            </a:r>
           </a:p>
         </p:txBody>
       </p:sp>
     </p:spTree>
     <p:extLst>
       <p:ext uri="{BB962C8B-B14F-4D97-AF65-F5344CB8AC3E}">
-        <p14:creationId xmlns:p14="http://schemas.microsoft.com/office/powerpoint/2010/main" xmlns="" val="7738407"/>
+        <p14:creationId xmlns:p14="http://schemas.microsoft.com/office/powerpoint/2010/main" val="7738407"/>
       </p:ext>
     </p:extLst>
   </p:cSld>
   <p:clrMapOvr>
     <a:masterClrMapping/>
   </p:clrMapOvr>
-  <p:timing>
-    <p:tnLst>
-      <p:par>
-        <p:cTn id="1" dur="indefinite" restart="never" nodeType="tmRoot"/>
-      </p:par>
-    </p:tnLst>
-  </p:timing>
 </p:sld>
 </file>
 
@@ -4584,16 +4544,12 @@
           <a:p>
             <a:pPr algn="ctr"/>
             <a:r>
-              <a:rPr lang="es-ES" sz="6600" dirty="0" smtClean="0">
+              <a:rPr lang="es-ES" sz="6600" dirty="0">
                 <a:latin typeface="Segoe UI Black" panose="020B0A02040204020203" pitchFamily="34" charset="0"/>
                 <a:ea typeface="Segoe UI Black" panose="020B0A02040204020203" pitchFamily="34" charset="0"/>
               </a:rPr>
               <a:t>PREGUNTAS</a:t>
             </a:r>
-            <a:endParaRPr lang="es-ES" sz="6600" dirty="0">
-              <a:latin typeface="Segoe UI Black" panose="020B0A02040204020203" pitchFamily="34" charset="0"/>
-              <a:ea typeface="Segoe UI Black" panose="020B0A02040204020203" pitchFamily="34" charset="0"/>
-            </a:endParaRPr>
           </a:p>
         </p:txBody>
       </p:sp>
@@ -4609,7 +4565,7 @@
           <a:blip r:embed="rId2" cstate="print">
             <a:extLst>
               <a:ext uri="{28A0092B-C50C-407E-A947-70E740481C1C}">
-                <a14:useLocalDpi xmlns:a14="http://schemas.microsoft.com/office/drawing/2010/main" xmlns="" val="0"/>
+                <a14:useLocalDpi xmlns:a14="http://schemas.microsoft.com/office/drawing/2010/main" val="0"/>
               </a:ext>
             </a:extLst>
           </a:blip>
@@ -4630,20 +4586,13 @@
     </p:spTree>
     <p:extLst>
       <p:ext uri="{BB962C8B-B14F-4D97-AF65-F5344CB8AC3E}">
-        <p14:creationId xmlns:p14="http://schemas.microsoft.com/office/powerpoint/2010/main" xmlns="" val="3057009119"/>
+        <p14:creationId xmlns:p14="http://schemas.microsoft.com/office/powerpoint/2010/main" val="3057009119"/>
       </p:ext>
     </p:extLst>
   </p:cSld>
   <p:clrMapOvr>
     <a:masterClrMapping/>
   </p:clrMapOvr>
-  <p:timing>
-    <p:tnLst>
-      <p:par>
-        <p:cTn id="1" dur="indefinite" restart="never" nodeType="tmRoot"/>
-      </p:par>
-    </p:tnLst>
-  </p:timing>
 </p:sld>
 </file>
 
@@ -4910,7 +4859,7 @@
   <a:extraClrSchemeLst/>
   <a:extLst>
     <a:ext uri="{05A4C25C-085E-4340-85A3-A5531E510DB2}">
-      <thm15:themeFamily xmlns:thm15="http://schemas.microsoft.com/office/thememl/2012/main" xmlns="" name="DividendVTI" id="{97558BDE-0B66-457C-BB6F-7B1B22DAA9B8}" vid="{F53508A3-AC60-448A-AF37-934D5F1A0D5E}"/>
+      <thm15:themeFamily xmlns:thm15="http://schemas.microsoft.com/office/thememl/2012/main" name="DividendVTI" id="{97558BDE-0B66-457C-BB6F-7B1B22DAA9B8}" vid="{F53508A3-AC60-448A-AF37-934D5F1A0D5E}"/>
     </a:ext>
   </a:extLst>
 </a:theme>

</xml_diff>